<commit_message>
Updated Presentation to include architecture changes and further project details
</commit_message>
<xml_diff>
--- a/Documents/Corner shop Specialist Pitch.pptx
+++ b/Documents/Corner shop Specialist Pitch.pptx
@@ -107,6 +107,11 @@
       </a:defRPr>
     </a:lvl9pPr>
   </p:defaultTextStyle>
+  <p:extLst>
+    <p:ext uri="{EFAFB233-063F-42B5-8137-9DF3F51BA10A}">
+      <p15:sldGuideLst xmlns:p15="http://schemas.microsoft.com/office/powerpoint/2012/main"/>
+    </p:ext>
+  </p:extLst>
 </p:presentation>
 </file>
 
@@ -296,7 +301,7 @@
           <a:p>
             <a:fld id="{4AAD347D-5ACD-4C99-B74B-A9C85AD731AF}" type="datetimeFigureOut">
               <a:rPr lang="en-US" dirty="0"/>
-              <a:t>1/27/2020</a:t>
+              <a:t>1/28/2020</a:t>
             </a:fld>
             <a:endParaRPr lang="en-US" dirty="0"/>
           </a:p>
@@ -566,7 +571,7 @@
           <a:p>
             <a:fld id="{4509A250-FF31-4206-8172-F9D3106AACB1}" type="datetimeFigureOut">
               <a:rPr lang="en-US" dirty="0"/>
-              <a:t>1/27/2020</a:t>
+              <a:t>1/28/2020</a:t>
             </a:fld>
             <a:endParaRPr lang="en-US" dirty="0"/>
           </a:p>
@@ -755,7 +760,7 @@
           <a:p>
             <a:fld id="{4509A250-FF31-4206-8172-F9D3106AACB1}" type="datetimeFigureOut">
               <a:rPr lang="en-US" dirty="0"/>
-              <a:t>1/27/2020</a:t>
+              <a:t>1/28/2020</a:t>
             </a:fld>
             <a:endParaRPr lang="en-US" dirty="0"/>
           </a:p>
@@ -1023,7 +1028,7 @@
           <a:p>
             <a:fld id="{4509A250-FF31-4206-8172-F9D3106AACB1}" type="datetimeFigureOut">
               <a:rPr lang="en-US" dirty="0"/>
-              <a:t>1/27/2020</a:t>
+              <a:t>1/28/2020</a:t>
             </a:fld>
             <a:endParaRPr lang="en-US" dirty="0"/>
           </a:p>
@@ -1359,7 +1364,7 @@
           <a:p>
             <a:fld id="{4509A250-FF31-4206-8172-F9D3106AACB1}" type="datetimeFigureOut">
               <a:rPr lang="en-US" dirty="0"/>
-              <a:t>1/27/2020</a:t>
+              <a:t>1/28/2020</a:t>
             </a:fld>
             <a:endParaRPr lang="en-US" dirty="0"/>
           </a:p>
@@ -1977,7 +1982,7 @@
           <a:p>
             <a:fld id="{4509A250-FF31-4206-8172-F9D3106AACB1}" type="datetimeFigureOut">
               <a:rPr lang="en-US" dirty="0"/>
-              <a:t>1/27/2020</a:t>
+              <a:t>1/28/2020</a:t>
             </a:fld>
             <a:endParaRPr lang="en-US" dirty="0"/>
           </a:p>
@@ -2832,7 +2837,7 @@
           <a:p>
             <a:fld id="{4509A250-FF31-4206-8172-F9D3106AACB1}" type="datetimeFigureOut">
               <a:rPr lang="en-US" dirty="0"/>
-              <a:t>1/27/2020</a:t>
+              <a:t>1/28/2020</a:t>
             </a:fld>
             <a:endParaRPr lang="en-US" dirty="0"/>
           </a:p>
@@ -2997,7 +3002,7 @@
           <a:p>
             <a:fld id="{4509A250-FF31-4206-8172-F9D3106AACB1}" type="datetimeFigureOut">
               <a:rPr lang="en-US" dirty="0"/>
-              <a:t>1/27/2020</a:t>
+              <a:t>1/28/2020</a:t>
             </a:fld>
             <a:endParaRPr lang="en-US" dirty="0"/>
           </a:p>
@@ -3172,7 +3177,7 @@
           <a:p>
             <a:fld id="{4509A250-FF31-4206-8172-F9D3106AACB1}" type="datetimeFigureOut">
               <a:rPr lang="en-US" dirty="0"/>
-              <a:t>1/27/2020</a:t>
+              <a:t>1/28/2020</a:t>
             </a:fld>
             <a:endParaRPr lang="en-US" dirty="0"/>
           </a:p>
@@ -3337,7 +3342,7 @@
           <a:p>
             <a:fld id="{4509A250-FF31-4206-8172-F9D3106AACB1}" type="datetimeFigureOut">
               <a:rPr lang="en-US" dirty="0"/>
-              <a:t>1/27/2020</a:t>
+              <a:t>1/28/2020</a:t>
             </a:fld>
             <a:endParaRPr lang="en-US" dirty="0"/>
           </a:p>
@@ -3579,7 +3584,7 @@
           <a:p>
             <a:fld id="{9796027F-7875-4030-9381-8BD8C4F21935}" type="datetimeFigureOut">
               <a:rPr lang="en-US" dirty="0"/>
-              <a:t>1/27/2020</a:t>
+              <a:t>1/28/2020</a:t>
             </a:fld>
             <a:endParaRPr lang="en-US" dirty="0"/>
           </a:p>
@@ -3866,7 +3871,7 @@
           <a:p>
             <a:fld id="{9796027F-7875-4030-9381-8BD8C4F21935}" type="datetimeFigureOut">
               <a:rPr lang="en-US" dirty="0"/>
-              <a:t>1/27/2020</a:t>
+              <a:t>1/28/2020</a:t>
             </a:fld>
             <a:endParaRPr lang="en-US" dirty="0"/>
           </a:p>
@@ -4305,7 +4310,7 @@
           <a:p>
             <a:fld id="{9796027F-7875-4030-9381-8BD8C4F21935}" type="datetimeFigureOut">
               <a:rPr lang="en-US" dirty="0"/>
-              <a:t>1/27/2020</a:t>
+              <a:t>1/28/2020</a:t>
             </a:fld>
             <a:endParaRPr lang="en-US" dirty="0"/>
           </a:p>
@@ -4418,7 +4423,7 @@
           <a:p>
             <a:fld id="{4509A250-FF31-4206-8172-F9D3106AACB1}" type="datetimeFigureOut">
               <a:rPr lang="en-US" dirty="0"/>
-              <a:t>1/27/2020</a:t>
+              <a:t>1/28/2020</a:t>
             </a:fld>
             <a:endParaRPr lang="en-US" dirty="0"/>
           </a:p>
@@ -4508,7 +4513,7 @@
           <a:p>
             <a:fld id="{4509A250-FF31-4206-8172-F9D3106AACB1}" type="datetimeFigureOut">
               <a:rPr lang="en-US" dirty="0"/>
-              <a:t>1/27/2020</a:t>
+              <a:t>1/28/2020</a:t>
             </a:fld>
             <a:endParaRPr lang="en-US" dirty="0"/>
           </a:p>
@@ -4782,7 +4787,7 @@
           <a:p>
             <a:fld id="{4509A250-FF31-4206-8172-F9D3106AACB1}" type="datetimeFigureOut">
               <a:rPr lang="en-US" dirty="0"/>
-              <a:t>1/27/2020</a:t>
+              <a:t>1/28/2020</a:t>
             </a:fld>
             <a:endParaRPr lang="en-US" dirty="0"/>
           </a:p>
@@ -5052,7 +5057,7 @@
           <a:p>
             <a:fld id="{4509A250-FF31-4206-8172-F9D3106AACB1}" type="datetimeFigureOut">
               <a:rPr lang="en-US" dirty="0"/>
-              <a:t>1/27/2020</a:t>
+              <a:t>1/28/2020</a:t>
             </a:fld>
             <a:endParaRPr lang="en-US" dirty="0"/>
           </a:p>
@@ -5476,7 +5481,7 @@
           <a:p>
             <a:fld id="{4AAD347D-5ACD-4C99-B74B-A9C85AD731AF}" type="datetimeFigureOut">
               <a:rPr lang="en-US" dirty="0"/>
-              <a:t>1/27/2020</a:t>
+              <a:t>1/28/2020</a:t>
             </a:fld>
             <a:endParaRPr lang="en-US" dirty="0"/>
           </a:p>
@@ -6137,7 +6142,19 @@
           <a:p>
             <a:r>
               <a:rPr lang="en-GB" dirty="0"/>
-              <a:t>I plan to modernise the systems that corner shops use to manage both stock and staff and provide an online solution to many problems retail staff deal with on a daily basis currently.</a:t>
+              <a:t>I plan to modernise the systems that corner shops use to manage both stock and staff and provide an online solution to many problems retail staff deal with on a daily basis currently such as newspaper rounds and staff management.</a:t>
+            </a:r>
+          </a:p>
+          <a:p>
+            <a:r>
+              <a:rPr lang="en-GB" dirty="0"/>
+              <a:t>This is due to my previous experience working in the industry and seeing the systems I used and the problems we encountered on a daily basis which I hope to minimise with my system.</a:t>
+            </a:r>
+          </a:p>
+          <a:p>
+            <a:r>
+              <a:rPr lang="en-GB" dirty="0"/>
+              <a:t>I have also decided on this problem due to the age of these systems and the use of outdated operating systems bringing rise to security risk that I want to mitigate by using a modern supported OS in the form of Windows 10</a:t>
             </a:r>
           </a:p>
         </p:txBody>
@@ -6200,36 +6217,6 @@
           </a:p>
         </p:txBody>
       </p:sp>
-      <p:pic>
-        <p:nvPicPr>
-          <p:cNvPr id="5" name="Picture 4">
-            <a:extLst>
-              <a:ext uri="{FF2B5EF4-FFF2-40B4-BE49-F238E27FC236}">
-                <a16:creationId xmlns:a16="http://schemas.microsoft.com/office/drawing/2014/main" id="{C4C594A7-FC66-4B28-93C8-9500125970BC}"/>
-              </a:ext>
-            </a:extLst>
-          </p:cNvPr>
-          <p:cNvPicPr>
-            <a:picLocks noChangeAspect="1"/>
-          </p:cNvPicPr>
-          <p:nvPr/>
-        </p:nvPicPr>
-        <p:blipFill>
-          <a:blip r:embed="rId2"/>
-          <a:stretch>
-            <a:fillRect/>
-          </a:stretch>
-        </p:blipFill>
-        <p:spPr>
-          <a:xfrm>
-            <a:off x="765175" y="2412058"/>
-            <a:ext cx="1774825" cy="2033883"/>
-          </a:xfrm>
-          <a:prstGeom prst="rect">
-            <a:avLst/>
-          </a:prstGeom>
-        </p:spPr>
-      </p:pic>
       <p:sp>
         <p:nvSpPr>
           <p:cNvPr id="6" name="TextBox 5">
@@ -6245,7 +6232,7 @@
         <p:spPr>
           <a:xfrm>
             <a:off x="646111" y="4851400"/>
-            <a:ext cx="2020889" cy="1477328"/>
+            <a:ext cx="2246957" cy="1477328"/>
           </a:xfrm>
           <a:prstGeom prst="rect">
             <a:avLst/>
@@ -6260,7 +6247,7 @@
           <a:p>
             <a:r>
               <a:rPr lang="en-GB" dirty="0"/>
-              <a:t>My database will be on amazon aurora hosted by AWS using MySQL</a:t>
+              <a:t>My database will be a MySQL database  hosted by AWS Relation database services</a:t>
             </a:r>
           </a:p>
         </p:txBody>
@@ -6319,7 +6306,7 @@
           <p:nvPr/>
         </p:nvPicPr>
         <p:blipFill>
-          <a:blip r:embed="rId3"/>
+          <a:blip r:embed="rId2"/>
           <a:stretch>
             <a:fillRect/>
           </a:stretch>
@@ -6466,7 +6453,7 @@
           <p:nvPr/>
         </p:nvPicPr>
         <p:blipFill>
-          <a:blip r:embed="rId4"/>
+          <a:blip r:embed="rId3"/>
           <a:stretch>
             <a:fillRect/>
           </a:stretch>
@@ -6522,6 +6509,71 @@
             <a:extLst>
               <a:ext uri="{FF2B5EF4-FFF2-40B4-BE49-F238E27FC236}">
                 <a16:creationId xmlns:a16="http://schemas.microsoft.com/office/drawing/2014/main" id="{0D5A3FFC-BED0-4C76-BA9D-BE0C9124D27D}"/>
+              </a:ext>
+            </a:extLst>
+          </p:cNvPr>
+          <p:cNvPicPr>
+            <a:picLocks noChangeAspect="1"/>
+          </p:cNvPicPr>
+          <p:nvPr/>
+        </p:nvPicPr>
+        <p:blipFill>
+          <a:blip r:embed="rId4"/>
+          <a:stretch>
+            <a:fillRect/>
+          </a:stretch>
+        </p:blipFill>
+        <p:spPr>
+          <a:xfrm>
+            <a:off x="8576885" y="3580506"/>
+            <a:ext cx="3105150" cy="1628775"/>
+          </a:xfrm>
+          <a:prstGeom prst="rect">
+            <a:avLst/>
+          </a:prstGeom>
+        </p:spPr>
+      </p:pic>
+      <p:sp>
+        <p:nvSpPr>
+          <p:cNvPr id="21" name="TextBox 20">
+            <a:extLst>
+              <a:ext uri="{FF2B5EF4-FFF2-40B4-BE49-F238E27FC236}">
+                <a16:creationId xmlns:a16="http://schemas.microsoft.com/office/drawing/2014/main" id="{D6E5A9DD-22AA-4EB3-A647-C3948C685632}"/>
+              </a:ext>
+            </a:extLst>
+          </p:cNvPr>
+          <p:cNvSpPr txBox="1"/>
+          <p:nvPr/>
+        </p:nvSpPr>
+        <p:spPr>
+          <a:xfrm>
+            <a:off x="8813055" y="5250386"/>
+            <a:ext cx="2716856" cy="1477328"/>
+          </a:xfrm>
+          <a:prstGeom prst="rect">
+            <a:avLst/>
+          </a:prstGeom>
+          <a:noFill/>
+        </p:spPr>
+        <p:txBody>
+          <a:bodyPr wrap="square" rtlCol="0">
+            <a:spAutoFit/>
+          </a:bodyPr>
+          <a:lstStyle/>
+          <a:p>
+            <a:r>
+              <a:rPr lang="en-GB" dirty="0"/>
+              <a:t>I will be building a website using HTML, CSS, JavaScript and AJAX for customers and staff</a:t>
+            </a:r>
+          </a:p>
+        </p:txBody>
+      </p:sp>
+      <p:pic>
+        <p:nvPicPr>
+          <p:cNvPr id="9" name="Picture 8" descr="A close up of a sign&#10;&#10;Description automatically generated">
+            <a:extLst>
+              <a:ext uri="{FF2B5EF4-FFF2-40B4-BE49-F238E27FC236}">
+                <a16:creationId xmlns:a16="http://schemas.microsoft.com/office/drawing/2014/main" id="{AC4C0A0C-BC57-40AA-BCF4-1B206729B4C0}"/>
               </a:ext>
             </a:extLst>
           </p:cNvPr>
@@ -6538,49 +6590,14 @@
         </p:blipFill>
         <p:spPr>
           <a:xfrm>
-            <a:off x="8576885" y="3580506"/>
-            <a:ext cx="3105150" cy="1628775"/>
+            <a:off x="166241" y="2156695"/>
+            <a:ext cx="2536663" cy="2536663"/>
           </a:xfrm>
           <a:prstGeom prst="rect">
             <a:avLst/>
           </a:prstGeom>
         </p:spPr>
       </p:pic>
-      <p:sp>
-        <p:nvSpPr>
-          <p:cNvPr id="21" name="TextBox 20">
-            <a:extLst>
-              <a:ext uri="{FF2B5EF4-FFF2-40B4-BE49-F238E27FC236}">
-                <a16:creationId xmlns:a16="http://schemas.microsoft.com/office/drawing/2014/main" id="{D6E5A9DD-22AA-4EB3-A647-C3948C685632}"/>
-              </a:ext>
-            </a:extLst>
-          </p:cNvPr>
-          <p:cNvSpPr txBox="1"/>
-          <p:nvPr/>
-        </p:nvSpPr>
-        <p:spPr>
-          <a:xfrm>
-            <a:off x="8813055" y="5250386"/>
-            <a:ext cx="2716856" cy="1477328"/>
-          </a:xfrm>
-          <a:prstGeom prst="rect">
-            <a:avLst/>
-          </a:prstGeom>
-          <a:noFill/>
-        </p:spPr>
-        <p:txBody>
-          <a:bodyPr wrap="square" rtlCol="0">
-            <a:spAutoFit/>
-          </a:bodyPr>
-          <a:lstStyle/>
-          <a:p>
-            <a:r>
-              <a:rPr lang="en-GB" dirty="0"/>
-              <a:t>I will be building a website using HTML, CSS, JavaScript and AJAX for customers and staff</a:t>
-            </a:r>
-          </a:p>
-        </p:txBody>
-      </p:sp>
     </p:spTree>
     <p:extLst>
       <p:ext uri="{BB962C8B-B14F-4D97-AF65-F5344CB8AC3E}">
@@ -6660,7 +6677,25 @@
           <a:bodyPr/>
           <a:lstStyle/>
           <a:p>
-            <a:endParaRPr lang="en-GB"/>
+            <a:r>
+              <a:rPr lang="en-GB" dirty="0"/>
+              <a:t>I plan to spend the rest of this week as a planning phase to finalise architecture and requirements and then to enter into five, 2 week, sprints to develop the software I have designed.</a:t>
+            </a:r>
+          </a:p>
+          <a:p>
+            <a:endParaRPr lang="en-GB" dirty="0"/>
+          </a:p>
+          <a:p>
+            <a:r>
+              <a:rPr lang="en-GB" dirty="0"/>
+              <a:t>What’s Next?</a:t>
+            </a:r>
+          </a:p>
+          <a:p>
+            <a:r>
+              <a:rPr lang="en-GB" dirty="0"/>
+              <a:t>My next steps are to finalise my initial requirements, develop my sprint plan and research my architecture and non-functional requirements before my sprints begin.</a:t>
+            </a:r>
           </a:p>
         </p:txBody>
       </p:sp>

</xml_diff>

<commit_message>
Added sprint plan to documents
</commit_message>
<xml_diff>
--- a/Documents/Corner shop Specialist Pitch.pptx
+++ b/Documents/Corner shop Specialist Pitch.pptx
@@ -6633,7 +6633,7 @@
           <a:lstStyle/>
           <a:p>
             <a:r>
-              <a:rPr lang="en-GB"/>
+              <a:rPr lang="en-GB" dirty="0"/>
               <a:t>Workplan</a:t>
             </a:r>
           </a:p>
@@ -6660,7 +6660,25 @@
           <a:bodyPr/>
           <a:lstStyle/>
           <a:p>
-            <a:endParaRPr lang="en-GB"/>
+            <a:r>
+              <a:rPr lang="en-GB" dirty="0"/>
+              <a:t>I plan to work in Sprints with an initial planning phase of 1-2 weeks then 5 two week  sprints to develop the software prescribed.</a:t>
+            </a:r>
+          </a:p>
+          <a:p>
+            <a:endParaRPr lang="en-GB" dirty="0"/>
+          </a:p>
+          <a:p>
+            <a:r>
+              <a:rPr lang="en-GB" dirty="0"/>
+              <a:t>What's Next?</a:t>
+            </a:r>
+          </a:p>
+          <a:p>
+            <a:r>
+              <a:rPr lang="en-GB" dirty="0"/>
+              <a:t>My immediate tasks are to fully research my architecture, complete my requirements analysis to include my payroll system and develop my sprint plan.</a:t>
+            </a:r>
           </a:p>
         </p:txBody>
       </p:sp>

</xml_diff>